<commit_message>
Commit before Spring 2024 semester
</commit_message>
<xml_diff>
--- a/2021fa_law379m/05_Authentication_and_Authorization.pptx
+++ b/2021fa_law379m/05_Authentication_and_Authorization.pptx
@@ -18775,7 +18775,7 @@
           <a:p>
             <a:fld id="{6CB03EA0-2F37-4F62-93D1-61BCD1BEDED7}" type="datetimeFigureOut">
               <a:rPr lang="en-US" smtClean="0"/>
-              <a:t>10/11/2021</a:t>
+              <a:t>1/15/2022</a:t>
             </a:fld>
             <a:endParaRPr lang="en-US"/>
           </a:p>
@@ -18988,7 +18988,7 @@
           <a:p>
             <a:fld id="{6CB03EA0-2F37-4F62-93D1-61BCD1BEDED7}" type="datetimeFigureOut">
               <a:rPr lang="en-US" smtClean="0"/>
-              <a:t>10/11/2021</a:t>
+              <a:t>1/15/2022</a:t>
             </a:fld>
             <a:endParaRPr lang="en-US"/>
           </a:p>
@@ -19244,7 +19244,7 @@
           <a:p>
             <a:fld id="{6CB03EA0-2F37-4F62-93D1-61BCD1BEDED7}" type="datetimeFigureOut">
               <a:rPr lang="en-US" smtClean="0"/>
-              <a:t>10/11/2021</a:t>
+              <a:t>1/15/2022</a:t>
             </a:fld>
             <a:endParaRPr lang="en-US"/>
           </a:p>
@@ -19372,7 +19372,7 @@
           <a:p>
             <a:fld id="{6CB03EA0-2F37-4F62-93D1-61BCD1BEDED7}" type="datetimeFigureOut">
               <a:rPr lang="en-US" smtClean="0"/>
-              <a:t>10/11/2021</a:t>
+              <a:t>1/15/2022</a:t>
             </a:fld>
             <a:endParaRPr lang="en-US"/>
           </a:p>
@@ -19599,7 +19599,7 @@
           <a:p>
             <a:fld id="{6CB03EA0-2F37-4F62-93D1-61BCD1BEDED7}" type="datetimeFigureOut">
               <a:rPr lang="en-US" smtClean="0"/>
-              <a:t>10/11/2021</a:t>
+              <a:t>1/15/2022</a:t>
             </a:fld>
             <a:endParaRPr lang="en-US"/>
           </a:p>
@@ -19942,7 +19942,7 @@
           <a:p>
             <a:fld id="{6CB03EA0-2F37-4F62-93D1-61BCD1BEDED7}" type="datetimeFigureOut">
               <a:rPr lang="en-US" smtClean="0"/>
-              <a:t>10/11/2021</a:t>
+              <a:t>1/15/2022</a:t>
             </a:fld>
             <a:endParaRPr lang="en-US"/>
           </a:p>
@@ -20222,7 +20222,7 @@
           <a:p>
             <a:fld id="{6CB03EA0-2F37-4F62-93D1-61BCD1BEDED7}" type="datetimeFigureOut">
               <a:rPr lang="en-US" smtClean="0"/>
-              <a:t>10/11/2021</a:t>
+              <a:t>1/15/2022</a:t>
             </a:fld>
             <a:endParaRPr lang="en-US"/>
           </a:p>
@@ -20601,7 +20601,7 @@
           <a:p>
             <a:fld id="{6CB03EA0-2F37-4F62-93D1-61BCD1BEDED7}" type="datetimeFigureOut">
               <a:rPr lang="en-US" smtClean="0"/>
-              <a:t>10/11/2021</a:t>
+              <a:t>1/15/2022</a:t>
             </a:fld>
             <a:endParaRPr lang="en-US"/>
           </a:p>
@@ -20719,7 +20719,7 @@
           <a:p>
             <a:fld id="{6CB03EA0-2F37-4F62-93D1-61BCD1BEDED7}" type="datetimeFigureOut">
               <a:rPr lang="en-US" smtClean="0"/>
-              <a:t>10/11/2021</a:t>
+              <a:t>1/15/2022</a:t>
             </a:fld>
             <a:endParaRPr lang="en-US"/>
           </a:p>
@@ -20890,7 +20890,7 @@
           <a:p>
             <a:fld id="{6CB03EA0-2F37-4F62-93D1-61BCD1BEDED7}" type="datetimeFigureOut">
               <a:rPr lang="en-US" smtClean="0"/>
-              <a:t>10/11/2021</a:t>
+              <a:t>1/15/2022</a:t>
             </a:fld>
             <a:endParaRPr lang="en-US"/>
           </a:p>
@@ -21244,7 +21244,7 @@
           <a:p>
             <a:fld id="{6CB03EA0-2F37-4F62-93D1-61BCD1BEDED7}" type="datetimeFigureOut">
               <a:rPr lang="en-US" smtClean="0"/>
-              <a:t>10/11/2021</a:t>
+              <a:t>1/15/2022</a:t>
             </a:fld>
             <a:endParaRPr lang="en-US"/>
           </a:p>
@@ -21626,7 +21626,7 @@
           <a:p>
             <a:fld id="{6CB03EA0-2F37-4F62-93D1-61BCD1BEDED7}" type="datetimeFigureOut">
               <a:rPr lang="en-US" smtClean="0"/>
-              <a:t>10/11/2021</a:t>
+              <a:t>1/15/2022</a:t>
             </a:fld>
             <a:endParaRPr lang="en-US"/>
           </a:p>
@@ -21913,7 +21913,7 @@
           <a:p>
             <a:fld id="{6CB03EA0-2F37-4F62-93D1-61BCD1BEDED7}" type="datetimeFigureOut">
               <a:rPr lang="en-US" smtClean="0"/>
-              <a:t>10/11/2021</a:t>
+              <a:t>1/15/2022</a:t>
             </a:fld>
             <a:endParaRPr lang="en-US"/>
           </a:p>
@@ -26985,13 +26985,13 @@
         </p:nvSpPr>
         <p:spPr>
           <a:xfrm>
-            <a:off x="5632784" y="5867400"/>
-            <a:ext cx="2895600" cy="612648"/>
+            <a:off x="5638800" y="5689963"/>
+            <a:ext cx="3276600" cy="612648"/>
           </a:xfrm>
           <a:prstGeom prst="wedgeRectCallout">
             <a:avLst>
-              <a:gd name="adj1" fmla="val 23136"/>
-              <a:gd name="adj2" fmla="val -317508"/>
+              <a:gd name="adj1" fmla="val 16279"/>
+              <a:gd name="adj2" fmla="val -319214"/>
             </a:avLst>
           </a:prstGeom>
         </p:spPr>
@@ -27018,15 +27018,15 @@
             <a:pPr algn="ctr"/>
             <a:r>
               <a:rPr lang="en-US" sz="2400" b="1" u="sng" dirty="0"/>
-              <a:t>PROOF n:</a:t>
+              <a:t>PROOF:</a:t>
             </a:r>
             <a:r>
               <a:rPr lang="en-US" sz="2400" b="1" dirty="0"/>
-              <a:t>  Identity </a:t>
+              <a:t>  Credential </a:t>
             </a:r>
             <a:r>
               <a:rPr lang="en-US" sz="2400" b="1" i="1" dirty="0"/>
-              <a:t>X</a:t>
+              <a:t>n</a:t>
             </a:r>
             <a:endParaRPr lang="en-US" sz="2400" b="1" u="sng" dirty="0"/>
           </a:p>
@@ -27046,13 +27046,13 @@
         </p:nvSpPr>
         <p:spPr>
           <a:xfrm>
-            <a:off x="4876800" y="5130191"/>
-            <a:ext cx="2743200" cy="612648"/>
+            <a:off x="4294632" y="5015560"/>
+            <a:ext cx="3200400" cy="612648"/>
           </a:xfrm>
           <a:prstGeom prst="wedgeRectCallout">
             <a:avLst>
-              <a:gd name="adj1" fmla="val 47201"/>
-              <a:gd name="adj2" fmla="val -214405"/>
+              <a:gd name="adj1" fmla="val 49650"/>
+              <a:gd name="adj2" fmla="val -223786"/>
             </a:avLst>
           </a:prstGeom>
         </p:spPr>
@@ -27079,15 +27079,11 @@
             <a:pPr algn="ctr"/>
             <a:r>
               <a:rPr lang="en-US" sz="2400" b="1" u="sng" dirty="0"/>
-              <a:t>PROOF 2:</a:t>
+              <a:t>PROOF:</a:t>
             </a:r>
             <a:r>
               <a:rPr lang="en-US" sz="2400" b="1" dirty="0"/>
-              <a:t>  Identity </a:t>
-            </a:r>
-            <a:r>
-              <a:rPr lang="en-US" sz="2400" b="1" i="1" dirty="0"/>
-              <a:t>X</a:t>
+              <a:t>  Credential 2</a:t>
             </a:r>
             <a:endParaRPr lang="en-US" sz="2400" b="1" u="sng" dirty="0"/>
           </a:p>
@@ -27233,13 +27229,13 @@
         </p:nvSpPr>
         <p:spPr>
           <a:xfrm>
-            <a:off x="4648200" y="2133600"/>
+            <a:off x="4648200" y="1857856"/>
             <a:ext cx="2590800" cy="612648"/>
           </a:xfrm>
           <a:prstGeom prst="wedgeRectCallout">
             <a:avLst>
-              <a:gd name="adj1" fmla="val 53238"/>
-              <a:gd name="adj2" fmla="val 94904"/>
+              <a:gd name="adj1" fmla="val 53641"/>
+              <a:gd name="adj2" fmla="val 132431"/>
             </a:avLst>
           </a:prstGeom>
         </p:spPr>
@@ -27294,13 +27290,13 @@
         </p:nvSpPr>
         <p:spPr>
           <a:xfrm>
-            <a:off x="2895600" y="3046476"/>
-            <a:ext cx="2590800" cy="612648"/>
+            <a:off x="2590800" y="3046476"/>
+            <a:ext cx="2895600" cy="612648"/>
           </a:xfrm>
           <a:prstGeom prst="wedgeRectCallout">
             <a:avLst>
-              <a:gd name="adj1" fmla="val -81205"/>
-              <a:gd name="adj2" fmla="val 12422"/>
+              <a:gd name="adj1" fmla="val -72904"/>
+              <a:gd name="adj2" fmla="val 18392"/>
             </a:avLst>
           </a:prstGeom>
         </p:spPr>
@@ -27326,9 +27322,14 @@
           <a:p>
             <a:pPr algn="ctr"/>
             <a:r>
+              <a:rPr lang="en-US" sz="2400" b="1" u="sng" dirty="0"/>
+              <a:t>CHALLENGE:</a:t>
+            </a:r>
+            <a:r>
               <a:rPr lang="en-US" sz="2400" b="1" dirty="0"/>
-              <a:t>Prove your claim</a:t>
-            </a:r>
+              <a:t>  Prove it</a:t>
+            </a:r>
+            <a:endParaRPr lang="en-US" sz="2400" b="1" u="sng" dirty="0"/>
           </a:p>
         </p:txBody>
       </p:sp>
@@ -27346,13 +27347,13 @@
         </p:nvSpPr>
         <p:spPr>
           <a:xfrm>
-            <a:off x="4648200" y="4224210"/>
-            <a:ext cx="2743200" cy="612648"/>
+            <a:off x="4032584" y="4133264"/>
+            <a:ext cx="3200400" cy="612648"/>
           </a:xfrm>
           <a:prstGeom prst="wedgeRectCallout">
             <a:avLst>
-              <a:gd name="adj1" fmla="val 51148"/>
-              <a:gd name="adj2" fmla="val -111302"/>
+              <a:gd name="adj1" fmla="val 50331"/>
+              <a:gd name="adj2" fmla="val -110449"/>
             </a:avLst>
           </a:prstGeom>
         </p:spPr>
@@ -27379,15 +27380,11 @@
             <a:pPr algn="ctr"/>
             <a:r>
               <a:rPr lang="en-US" sz="2400" b="1" u="sng" dirty="0"/>
-              <a:t>PROOF 1:</a:t>
+              <a:t>PROOF:</a:t>
             </a:r>
             <a:r>
               <a:rPr lang="en-US" sz="2400" b="1" dirty="0"/>
-              <a:t>  Identity </a:t>
-            </a:r>
-            <a:r>
-              <a:rPr lang="en-US" sz="2400" b="1" i="1" dirty="0"/>
-              <a:t>X</a:t>
+              <a:t>  Credential 1</a:t>
             </a:r>
             <a:endParaRPr lang="en-US" sz="2400" b="1" u="sng" dirty="0"/>
           </a:p>
@@ -27413,7 +27410,11 @@
           <a:prstGeom prst="roundRect">
             <a:avLst/>
           </a:prstGeom>
-          <a:noFill/>
+          <a:solidFill>
+            <a:schemeClr val="bg1">
+              <a:lumMod val="85000"/>
+            </a:schemeClr>
+          </a:solidFill>
           <a:ln w="9525" cap="flat" cmpd="sng" algn="ctr">
             <a:solidFill>
               <a:schemeClr val="dk1"/>

</xml_diff>